<commit_message>
Analysis finding gender disparity updated
</commit_message>
<xml_diff>
--- a/Olympic Data Analysis.pptx
+++ b/Olympic Data Analysis.pptx
@@ -278,7 +278,7 @@
               <a:pPr>
                 <a:defRPr/>
               </a:pPr>
-              <a:t>2024-04-22</a:t>
+              <a:t>2024-04-23</a:t>
             </a:fld>
             <a:endParaRPr lang="en-CA"/>
           </a:p>
@@ -14646,7 +14646,21 @@
           <a:p>
             <a:r>
               <a:rPr lang="en-CA" sz="2400" dirty="0"/>
-              <a:t>Noticed a trend in increase of women participation in Olympics.</a:t>
+              <a:t>Gender Disparity exist in initial Years of Olympics and gradually decreased over time.</a:t>
+            </a:r>
+          </a:p>
+          <a:p>
+            <a:r>
+              <a:rPr lang="en-CA" sz="2400" dirty="0"/>
+              <a:t>Noticed a trend in increase of women participation in Olympics from Nil participation to 45% </a:t>
+            </a:r>
+            <a:r>
+              <a:rPr lang="en-CA" sz="2400"/>
+              <a:t>by 2016</a:t>
+            </a:r>
+            <a:r>
+              <a:rPr lang="en-CA" sz="2400" dirty="0"/>
+              <a:t>.</a:t>
             </a:r>
           </a:p>
           <a:p>

</xml_diff>